<commit_message>
MAJ après retour de Romain sur séance MapReduce
</commit_message>
<xml_diff>
--- a/slides/MapReduce.pptx
+++ b/slides/MapReduce.pptx
@@ -9,9 +9,10 @@
     <p:sldId id="257" r:id="rId3"/>
     <p:sldId id="258" r:id="rId4"/>
     <p:sldId id="262" r:id="rId5"/>
-    <p:sldId id="259" r:id="rId6"/>
-    <p:sldId id="263" r:id="rId7"/>
-    <p:sldId id="261" r:id="rId8"/>
+    <p:sldId id="264" r:id="rId6"/>
+    <p:sldId id="259" r:id="rId7"/>
+    <p:sldId id="263" r:id="rId8"/>
+    <p:sldId id="261" r:id="rId9"/>
   </p:sldIdLst>
   <p:sldSz cx="12192000" cy="6858000"/>
   <p:notesSz cx="6858000" cy="9144000"/>
@@ -265,7 +266,7 @@
           <a:p>
             <a:fld id="{A56E0DAD-19EA-4BB4-9AEF-5FF301A2C8FE}" type="datetimeFigureOut">
               <a:rPr lang="fr-FR" smtClean="0"/>
-              <a:t>09/09/2023</a:t>
+              <a:t>12/09/2023</a:t>
             </a:fld>
             <a:endParaRPr lang="fr-FR"/>
           </a:p>
@@ -463,7 +464,7 @@
           <a:p>
             <a:fld id="{A56E0DAD-19EA-4BB4-9AEF-5FF301A2C8FE}" type="datetimeFigureOut">
               <a:rPr lang="fr-FR" smtClean="0"/>
-              <a:t>09/09/2023</a:t>
+              <a:t>12/09/2023</a:t>
             </a:fld>
             <a:endParaRPr lang="fr-FR"/>
           </a:p>
@@ -671,7 +672,7 @@
           <a:p>
             <a:fld id="{A56E0DAD-19EA-4BB4-9AEF-5FF301A2C8FE}" type="datetimeFigureOut">
               <a:rPr lang="fr-FR" smtClean="0"/>
-              <a:t>09/09/2023</a:t>
+              <a:t>12/09/2023</a:t>
             </a:fld>
             <a:endParaRPr lang="fr-FR"/>
           </a:p>
@@ -901,7 +902,7 @@
           <a:p>
             <a:fld id="{A56E0DAD-19EA-4BB4-9AEF-5FF301A2C8FE}" type="datetimeFigureOut">
               <a:rPr lang="fr-FR" smtClean="0"/>
-              <a:t>09/09/2023</a:t>
+              <a:t>12/09/2023</a:t>
             </a:fld>
             <a:endParaRPr lang="fr-FR"/>
           </a:p>
@@ -1176,7 +1177,7 @@
           <a:p>
             <a:fld id="{A56E0DAD-19EA-4BB4-9AEF-5FF301A2C8FE}" type="datetimeFigureOut">
               <a:rPr lang="fr-FR" smtClean="0"/>
-              <a:t>09/09/2023</a:t>
+              <a:t>12/09/2023</a:t>
             </a:fld>
             <a:endParaRPr lang="fr-FR"/>
           </a:p>
@@ -1499,7 +1500,7 @@
           <a:p>
             <a:fld id="{A56E0DAD-19EA-4BB4-9AEF-5FF301A2C8FE}" type="datetimeFigureOut">
               <a:rPr lang="fr-FR" smtClean="0"/>
-              <a:t>09/09/2023</a:t>
+              <a:t>12/09/2023</a:t>
             </a:fld>
             <a:endParaRPr lang="fr-FR"/>
           </a:p>
@@ -1973,7 +1974,7 @@
           <a:p>
             <a:fld id="{A56E0DAD-19EA-4BB4-9AEF-5FF301A2C8FE}" type="datetimeFigureOut">
               <a:rPr lang="fr-FR" smtClean="0"/>
-              <a:t>09/09/2023</a:t>
+              <a:t>12/09/2023</a:t>
             </a:fld>
             <a:endParaRPr lang="fr-FR"/>
           </a:p>
@@ -2114,7 +2115,7 @@
           <a:p>
             <a:fld id="{A56E0DAD-19EA-4BB4-9AEF-5FF301A2C8FE}" type="datetimeFigureOut">
               <a:rPr lang="fr-FR" smtClean="0"/>
-              <a:t>09/09/2023</a:t>
+              <a:t>12/09/2023</a:t>
             </a:fld>
             <a:endParaRPr lang="fr-FR"/>
           </a:p>
@@ -2227,7 +2228,7 @@
           <a:p>
             <a:fld id="{A56E0DAD-19EA-4BB4-9AEF-5FF301A2C8FE}" type="datetimeFigureOut">
               <a:rPr lang="fr-FR" smtClean="0"/>
-              <a:t>09/09/2023</a:t>
+              <a:t>12/09/2023</a:t>
             </a:fld>
             <a:endParaRPr lang="fr-FR"/>
           </a:p>
@@ -2538,7 +2539,7 @@
           <a:p>
             <a:fld id="{A56E0DAD-19EA-4BB4-9AEF-5FF301A2C8FE}" type="datetimeFigureOut">
               <a:rPr lang="fr-FR" smtClean="0"/>
-              <a:t>09/09/2023</a:t>
+              <a:t>12/09/2023</a:t>
             </a:fld>
             <a:endParaRPr lang="fr-FR"/>
           </a:p>
@@ -2826,7 +2827,7 @@
           <a:p>
             <a:fld id="{A56E0DAD-19EA-4BB4-9AEF-5FF301A2C8FE}" type="datetimeFigureOut">
               <a:rPr lang="fr-FR" smtClean="0"/>
-              <a:t>09/09/2023</a:t>
+              <a:t>12/09/2023</a:t>
             </a:fld>
             <a:endParaRPr lang="fr-FR"/>
           </a:p>
@@ -3067,7 +3068,7 @@
           <a:p>
             <a:fld id="{A56E0DAD-19EA-4BB4-9AEF-5FF301A2C8FE}" type="datetimeFigureOut">
               <a:rPr lang="fr-FR" smtClean="0"/>
-              <a:t>09/09/2023</a:t>
+              <a:t>12/09/2023</a:t>
             </a:fld>
             <a:endParaRPr lang="fr-FR"/>
           </a:p>
@@ -5255,6 +5256,42 @@
               </a:rPr>
               <a:t>reducer</a:t>
             </a:r>
+            <a:r>
+              <a:rPr lang="fr-FR" dirty="0">
+                <a:latin typeface="Courier New" panose="02070309020205020404" pitchFamily="49" charset="0"/>
+                <a:cs typeface="Courier New" panose="02070309020205020404" pitchFamily="49" charset="0"/>
+              </a:rPr>
+              <a:t> </a:t>
+            </a:r>
+            <a:r>
+              <a:rPr lang="fr-FR" dirty="0">
+                <a:cs typeface="Courier New" panose="02070309020205020404" pitchFamily="49" charset="0"/>
+                <a:sym typeface="Wingdings" panose="05000000000000000000" pitchFamily="2" charset="2"/>
+              </a:rPr>
+              <a:t> étape de type « </a:t>
+            </a:r>
+            <a:r>
+              <a:rPr lang="fr-FR" dirty="0" err="1">
+                <a:cs typeface="Courier New" panose="02070309020205020404" pitchFamily="49" charset="0"/>
+                <a:sym typeface="Wingdings" panose="05000000000000000000" pitchFamily="2" charset="2"/>
+              </a:rPr>
+              <a:t>Map</a:t>
+            </a:r>
+            <a:r>
+              <a:rPr lang="fr-FR" dirty="0">
+                <a:cs typeface="Courier New" panose="02070309020205020404" pitchFamily="49" charset="0"/>
+                <a:sym typeface="Wingdings" panose="05000000000000000000" pitchFamily="2" charset="2"/>
+              </a:rPr>
+              <a:t> » sur les </a:t>
+            </a:r>
+            <a:r>
+              <a:rPr lang="fr-FR" dirty="0" err="1">
+                <a:latin typeface="Courier New" panose="02070309020205020404" pitchFamily="49" charset="0"/>
+                <a:cs typeface="Courier New" panose="02070309020205020404" pitchFamily="49" charset="0"/>
+                <a:sym typeface="Wingdings" panose="05000000000000000000" pitchFamily="2" charset="2"/>
+              </a:rPr>
+              <a:t>reducer</a:t>
+            </a:r>
             <a:endParaRPr lang="fr-FR" dirty="0">
               <a:latin typeface="Courier New" panose="02070309020205020404" pitchFamily="49" charset="0"/>
               <a:cs typeface="Courier New" panose="02070309020205020404" pitchFamily="49" charset="0"/>
@@ -5283,6 +5320,410 @@
 </file>
 
 <file path=ppt/slides/slide5.xml><?xml version="1.0" encoding="utf-8"?>
+<p:sld xmlns:a="http://schemas.openxmlformats.org/drawingml/2006/main" xmlns:r="http://schemas.openxmlformats.org/officeDocument/2006/relationships" xmlns:p="http://schemas.openxmlformats.org/presentationml/2006/main">
+  <p:cSld>
+    <p:spTree>
+      <p:nvGrpSpPr>
+        <p:cNvPr id="1" name=""/>
+        <p:cNvGrpSpPr/>
+        <p:nvPr/>
+      </p:nvGrpSpPr>
+      <p:grpSpPr>
+        <a:xfrm>
+          <a:off x="0" y="0"/>
+          <a:ext cx="0" cy="0"/>
+          <a:chOff x="0" y="0"/>
+          <a:chExt cx="0" cy="0"/>
+        </a:xfrm>
+      </p:grpSpPr>
+      <p:sp>
+        <p:nvSpPr>
+          <p:cNvPr id="2" name="Titre 1">
+            <a:extLst>
+              <a:ext uri="{FF2B5EF4-FFF2-40B4-BE49-F238E27FC236}">
+                <a16:creationId xmlns:a16="http://schemas.microsoft.com/office/drawing/2014/main" id="{8977FF0D-5419-4F66-AC20-911FAB4C2EC1}"/>
+              </a:ext>
+            </a:extLst>
+          </p:cNvPr>
+          <p:cNvSpPr>
+            <a:spLocks noGrp="1"/>
+          </p:cNvSpPr>
+          <p:nvPr>
+            <p:ph type="title"/>
+          </p:nvPr>
+        </p:nvSpPr>
+        <p:spPr/>
+        <p:txBody>
+          <a:bodyPr/>
+          <a:lstStyle/>
+          <a:p>
+            <a:r>
+              <a:rPr lang="fr-FR" dirty="0"/>
+              <a:t>Flux de traitements MapReduce</a:t>
+            </a:r>
+          </a:p>
+        </p:txBody>
+      </p:sp>
+      <p:sp>
+        <p:nvSpPr>
+          <p:cNvPr id="4" name="Espace réservé du contenu 3">
+            <a:extLst>
+              <a:ext uri="{FF2B5EF4-FFF2-40B4-BE49-F238E27FC236}">
+                <a16:creationId xmlns:a16="http://schemas.microsoft.com/office/drawing/2014/main" id="{3D9A5BFE-60FA-4F03-8EE8-96FA6ECA3C9D}"/>
+              </a:ext>
+            </a:extLst>
+          </p:cNvPr>
+          <p:cNvSpPr>
+            <a:spLocks noGrp="1"/>
+          </p:cNvSpPr>
+          <p:nvPr>
+            <p:ph idx="1"/>
+          </p:nvPr>
+        </p:nvSpPr>
+        <p:spPr/>
+        <p:txBody>
+          <a:bodyPr>
+            <a:normAutofit fontScale="77500" lnSpcReduction="20000"/>
+          </a:bodyPr>
+          <a:lstStyle/>
+          <a:p>
+            <a:r>
+              <a:rPr lang="fr-FR" dirty="0"/>
+              <a:t>Exemple de flux pour le problème du « </a:t>
+            </a:r>
+            <a:r>
+              <a:rPr lang="fr-FR" dirty="0" err="1"/>
+              <a:t>wordcount</a:t>
+            </a:r>
+            <a:r>
+              <a:rPr lang="fr-FR" dirty="0"/>
+              <a:t> »</a:t>
+            </a:r>
+          </a:p>
+          <a:p>
+            <a:pPr marL="0" indent="0">
+              <a:buNone/>
+            </a:pPr>
+            <a:endParaRPr lang="fr-FR" dirty="0"/>
+          </a:p>
+          <a:p>
+            <a:pPr marL="457200" lvl="1" indent="0">
+              <a:buNone/>
+            </a:pPr>
+            <a:r>
+              <a:rPr lang="fr-FR" dirty="0">
+                <a:sym typeface="Wingdings" panose="05000000000000000000" pitchFamily="2" charset="2"/>
+              </a:rPr>
+              <a:t> </a:t>
+            </a:r>
+            <a:r>
+              <a:rPr lang="fr-FR" dirty="0"/>
+              <a:t>On dispose d’un corpus de textes réparti en plusieurs fichiers</a:t>
+            </a:r>
+          </a:p>
+          <a:p>
+            <a:pPr lvl="1">
+              <a:buFont typeface="Wingdings" panose="05000000000000000000" pitchFamily="2" charset="2"/>
+              <a:buChar char="à"/>
+            </a:pPr>
+            <a:r>
+              <a:rPr lang="fr-FR" dirty="0"/>
+              <a:t> On veut compter le nombre d’occurrences de chaque mot dans le corpus</a:t>
+            </a:r>
+          </a:p>
+          <a:p>
+            <a:pPr marL="457200" lvl="1" indent="0">
+              <a:buNone/>
+            </a:pPr>
+            <a:endParaRPr lang="fr-FR" dirty="0"/>
+          </a:p>
+          <a:p>
+            <a:pPr>
+              <a:buFont typeface="Wingdings" panose="05000000000000000000" pitchFamily="2" charset="2"/>
+              <a:buChar char="§"/>
+            </a:pPr>
+            <a:r>
+              <a:rPr lang="fr-FR" sz="2100" dirty="0">
+                <a:solidFill>
+                  <a:schemeClr val="accent1"/>
+                </a:solidFill>
+              </a:rPr>
+              <a:t>(clé, valeur) d’entrée = (indice d’un fichier, nom du fichier)</a:t>
+            </a:r>
+          </a:p>
+          <a:p>
+            <a:pPr lvl="1">
+              <a:buFont typeface="Wingdings" panose="05000000000000000000" pitchFamily="2" charset="2"/>
+              <a:buChar char="Ø"/>
+            </a:pPr>
+            <a:r>
+              <a:rPr lang="fr-FR" sz="1900" i="1" dirty="0">
+                <a:solidFill>
+                  <a:srgbClr val="FF0000"/>
+                </a:solidFill>
+                <a:latin typeface="Courier New" panose="02070309020205020404" pitchFamily="49" charset="0"/>
+                <a:cs typeface="Courier New" panose="02070309020205020404" pitchFamily="49" charset="0"/>
+              </a:rPr>
+              <a:t>mapper</a:t>
+            </a:r>
+            <a:r>
+              <a:rPr lang="fr-FR" sz="1900" i="1" dirty="0">
+                <a:solidFill>
+                  <a:srgbClr val="FF0000"/>
+                </a:solidFill>
+              </a:rPr>
+              <a:t>(+</a:t>
+            </a:r>
+            <a:r>
+              <a:rPr lang="fr-FR" sz="1900" i="1" dirty="0">
+                <a:solidFill>
+                  <a:srgbClr val="FF0000"/>
+                </a:solidFill>
+                <a:latin typeface="Courier New" panose="02070309020205020404" pitchFamily="49" charset="0"/>
+                <a:cs typeface="Courier New" panose="02070309020205020404" pitchFamily="49" charset="0"/>
+              </a:rPr>
+              <a:t>combiner</a:t>
+            </a:r>
+            <a:r>
+              <a:rPr lang="fr-FR" sz="1900" i="1" dirty="0">
+                <a:solidFill>
+                  <a:srgbClr val="FF0000"/>
+                </a:solidFill>
+              </a:rPr>
+              <a:t>) = fonction de comptage des mots dans </a:t>
+            </a:r>
+            <a:r>
+              <a:rPr lang="fr-FR" sz="1900" b="1" i="1" u="sng" dirty="0">
+                <a:solidFill>
+                  <a:srgbClr val="FF0000"/>
+                </a:solidFill>
+              </a:rPr>
+              <a:t>un</a:t>
+            </a:r>
+            <a:r>
+              <a:rPr lang="fr-FR" sz="1900" i="1" dirty="0">
+                <a:solidFill>
+                  <a:srgbClr val="FF0000"/>
+                </a:solidFill>
+              </a:rPr>
+              <a:t> fichier</a:t>
+            </a:r>
+          </a:p>
+          <a:p>
+            <a:pPr>
+              <a:buFont typeface="Wingdings" panose="05000000000000000000" pitchFamily="2" charset="2"/>
+              <a:buChar char="§"/>
+            </a:pPr>
+            <a:r>
+              <a:rPr lang="fr-FR" sz="2100" dirty="0">
+                <a:solidFill>
+                  <a:schemeClr val="accent1"/>
+                </a:solidFill>
+              </a:rPr>
+              <a:t>(clé, valeur) intermédiaire = (mot, comptage du mot dans </a:t>
+            </a:r>
+            <a:r>
+              <a:rPr lang="fr-FR" sz="2100" b="1" u="sng" dirty="0">
+                <a:solidFill>
+                  <a:schemeClr val="accent1"/>
+                </a:solidFill>
+              </a:rPr>
+              <a:t>un</a:t>
+            </a:r>
+            <a:r>
+              <a:rPr lang="fr-FR" sz="2100" dirty="0">
+                <a:solidFill>
+                  <a:schemeClr val="accent1"/>
+                </a:solidFill>
+              </a:rPr>
+              <a:t> fichier)</a:t>
+            </a:r>
+          </a:p>
+          <a:p>
+            <a:pPr lvl="1">
+              <a:buFont typeface="Wingdings" panose="05000000000000000000" pitchFamily="2" charset="2"/>
+              <a:buChar char="Ø"/>
+            </a:pPr>
+            <a:r>
+              <a:rPr lang="fr-FR" sz="1900" i="1" dirty="0" err="1">
+                <a:solidFill>
+                  <a:srgbClr val="FF0000"/>
+                </a:solidFill>
+                <a:latin typeface="Courier New" panose="02070309020205020404" pitchFamily="49" charset="0"/>
+                <a:cs typeface="Courier New" panose="02070309020205020404" pitchFamily="49" charset="0"/>
+              </a:rPr>
+              <a:t>partitioner</a:t>
+            </a:r>
+            <a:r>
+              <a:rPr lang="fr-FR" sz="1900" i="1" dirty="0">
+                <a:solidFill>
+                  <a:srgbClr val="FF0000"/>
+                </a:solidFill>
+              </a:rPr>
+              <a:t> = fonction qui rassemble les comptages (dans chaque fichier) par mot</a:t>
+            </a:r>
+          </a:p>
+          <a:p>
+            <a:pPr>
+              <a:buFont typeface="Wingdings" panose="05000000000000000000" pitchFamily="2" charset="2"/>
+              <a:buChar char="§"/>
+            </a:pPr>
+            <a:r>
+              <a:rPr lang="fr-FR" sz="2100" dirty="0">
+                <a:solidFill>
+                  <a:schemeClr val="accent1"/>
+                </a:solidFill>
+              </a:rPr>
+              <a:t>(clé, [liste de valeurs]) intermédiaire = (mot, [</a:t>
+            </a:r>
+            <a:r>
+              <a:rPr lang="fr-FR" sz="2100" b="1" u="sng" dirty="0">
+                <a:solidFill>
+                  <a:schemeClr val="accent1"/>
+                </a:solidFill>
+              </a:rPr>
+              <a:t>liste</a:t>
+            </a:r>
+            <a:r>
+              <a:rPr lang="fr-FR" sz="2100" dirty="0">
+                <a:solidFill>
+                  <a:schemeClr val="accent1"/>
+                </a:solidFill>
+              </a:rPr>
+              <a:t> des comptages du mot dans chaque fichier])</a:t>
+            </a:r>
+          </a:p>
+          <a:p>
+            <a:pPr lvl="1">
+              <a:buFont typeface="Wingdings" panose="05000000000000000000" pitchFamily="2" charset="2"/>
+              <a:buChar char="Ø"/>
+            </a:pPr>
+            <a:r>
+              <a:rPr lang="fr-FR" sz="1900" i="1" dirty="0" err="1">
+                <a:solidFill>
+                  <a:srgbClr val="FF0000"/>
+                </a:solidFill>
+                <a:latin typeface="Courier New" panose="02070309020205020404" pitchFamily="49" charset="0"/>
+                <a:cs typeface="Courier New" panose="02070309020205020404" pitchFamily="49" charset="0"/>
+              </a:rPr>
+              <a:t>reducer</a:t>
+            </a:r>
+            <a:r>
+              <a:rPr lang="fr-FR" sz="1900" i="1" dirty="0">
+                <a:solidFill>
+                  <a:srgbClr val="FF0000"/>
+                </a:solidFill>
+              </a:rPr>
+              <a:t> = fonction qui additionne les comptages d’</a:t>
+            </a:r>
+            <a:r>
+              <a:rPr lang="fr-FR" sz="1900" b="1" i="1" u="sng" dirty="0">
+                <a:solidFill>
+                  <a:srgbClr val="FF0000"/>
+                </a:solidFill>
+              </a:rPr>
+              <a:t>un</a:t>
+            </a:r>
+            <a:r>
+              <a:rPr lang="fr-FR" sz="1900" i="1" dirty="0">
+                <a:solidFill>
+                  <a:srgbClr val="FF0000"/>
+                </a:solidFill>
+              </a:rPr>
+              <a:t> mot</a:t>
+            </a:r>
+          </a:p>
+          <a:p>
+            <a:pPr>
+              <a:buFont typeface="Wingdings" panose="05000000000000000000" pitchFamily="2" charset="2"/>
+              <a:buChar char="§"/>
+            </a:pPr>
+            <a:r>
+              <a:rPr lang="fr-FR" sz="2100" dirty="0">
+                <a:solidFill>
+                  <a:schemeClr val="accent1"/>
+                </a:solidFill>
+              </a:rPr>
+              <a:t>(clé, valeur) de sortie = (mot, comptage du mot dans le corpus)</a:t>
+            </a:r>
+          </a:p>
+          <a:p>
+            <a:pPr marL="0" indent="0">
+              <a:buNone/>
+            </a:pPr>
+            <a:endParaRPr lang="fr-FR" dirty="0"/>
+          </a:p>
+          <a:p>
+            <a:pPr marL="0" indent="0">
+              <a:buNone/>
+            </a:pPr>
+            <a:r>
+              <a:rPr lang="fr-FR" sz="2400" i="1" dirty="0"/>
+              <a:t>Remarque : ici il y a un </a:t>
+            </a:r>
+            <a:r>
+              <a:rPr lang="fr-FR" sz="2400" i="1" dirty="0" err="1">
+                <a:latin typeface="Courier New" panose="02070309020205020404" pitchFamily="49" charset="0"/>
+                <a:cs typeface="Courier New" panose="02070309020205020404" pitchFamily="49" charset="0"/>
+              </a:rPr>
+              <a:t>reducer</a:t>
+            </a:r>
+            <a:r>
+              <a:rPr lang="fr-FR" sz="2400" i="1" dirty="0"/>
+              <a:t> par mot. Ces </a:t>
+            </a:r>
+            <a:r>
+              <a:rPr lang="fr-FR" sz="2400" i="1" dirty="0" err="1">
+                <a:latin typeface="Courier New" panose="02070309020205020404" pitchFamily="49" charset="0"/>
+                <a:cs typeface="Courier New" panose="02070309020205020404" pitchFamily="49" charset="0"/>
+              </a:rPr>
+              <a:t>reducer</a:t>
+            </a:r>
+            <a:r>
+              <a:rPr lang="fr-FR" sz="2400" i="1" dirty="0"/>
+              <a:t> peuvent être parallélisés par un processus de type « </a:t>
+            </a:r>
+            <a:r>
+              <a:rPr lang="fr-FR" sz="2400" i="1" dirty="0" err="1"/>
+              <a:t>Map</a:t>
+            </a:r>
+            <a:r>
+              <a:rPr lang="fr-FR" sz="2400" i="1" dirty="0"/>
+              <a:t> »</a:t>
+            </a:r>
+          </a:p>
+          <a:p>
+            <a:pPr lvl="2">
+              <a:buFont typeface="Wingdings" panose="05000000000000000000" pitchFamily="2" charset="2"/>
+              <a:buChar char="§"/>
+            </a:pPr>
+            <a:endParaRPr lang="fr-FR" i="1" dirty="0"/>
+          </a:p>
+          <a:p>
+            <a:pPr marL="457200" lvl="1" indent="0">
+              <a:buNone/>
+            </a:pPr>
+            <a:endParaRPr lang="fr-FR" dirty="0">
+              <a:latin typeface="Courier New" panose="02070309020205020404" pitchFamily="49" charset="0"/>
+              <a:cs typeface="Courier New" panose="02070309020205020404" pitchFamily="49" charset="0"/>
+            </a:endParaRPr>
+          </a:p>
+        </p:txBody>
+      </p:sp>
+    </p:spTree>
+    <p:extLst>
+      <p:ext uri="{BB962C8B-B14F-4D97-AF65-F5344CB8AC3E}">
+        <p14:creationId xmlns:p14="http://schemas.microsoft.com/office/powerpoint/2010/main" val="1382126758"/>
+      </p:ext>
+    </p:extLst>
+  </p:cSld>
+  <p:clrMapOvr>
+    <a:masterClrMapping/>
+  </p:clrMapOvr>
+</p:sld>
+</file>
+
+<file path=ppt/slides/slide6.xml><?xml version="1.0" encoding="utf-8"?>
 <p:sld xmlns:a="http://schemas.openxmlformats.org/drawingml/2006/main" xmlns:r="http://schemas.openxmlformats.org/officeDocument/2006/relationships" xmlns:p="http://schemas.openxmlformats.org/presentationml/2006/main">
   <p:cSld>
     <p:spTree>
@@ -5975,7 +6416,7 @@
 </p:sld>
 </file>
 
-<file path=ppt/slides/slide6.xml><?xml version="1.0" encoding="utf-8"?>
+<file path=ppt/slides/slide7.xml><?xml version="1.0" encoding="utf-8"?>
 <p:sld xmlns:a="http://schemas.openxmlformats.org/drawingml/2006/main" xmlns:r="http://schemas.openxmlformats.org/officeDocument/2006/relationships" xmlns:p="http://schemas.openxmlformats.org/presentationml/2006/main">
   <p:cSld>
     <p:spTree>
@@ -6840,7 +7281,7 @@
 </p:sld>
 </file>
 
-<file path=ppt/slides/slide7.xml><?xml version="1.0" encoding="utf-8"?>
+<file path=ppt/slides/slide8.xml><?xml version="1.0" encoding="utf-8"?>
 <p:sld xmlns:a="http://schemas.openxmlformats.org/drawingml/2006/main" xmlns:r="http://schemas.openxmlformats.org/officeDocument/2006/relationships" xmlns:p="http://schemas.openxmlformats.org/presentationml/2006/main">
   <p:cSld>
     <p:spTree>

</xml_diff>